<commit_message>
Update Improving patient experience using AI.pptx
</commit_message>
<xml_diff>
--- a/Improving patient experience using AI.pptx
+++ b/Improving patient experience using AI.pptx
@@ -592,7 +592,7 @@
           <a:p>
             <a:fld id="{584B9C3D-A6AA-4477-AC5E-4C46DDCA9DCD}" type="datetimeFigureOut">
               <a:rPr lang="en-US" smtClean="0"/>
-              <a:t>5/9/2025</a:t>
+              <a:t>5/10/2025</a:t>
             </a:fld>
             <a:endParaRPr lang="en-US" dirty="0"/>
           </a:p>
@@ -769,7 +769,7 @@
           <a:p>
             <a:fld id="{E3938646-CEA8-41F9-BD9F-D1FA107D99CC}" type="datetimeFigureOut">
               <a:rPr lang="en-US" smtClean="0"/>
-              <a:t>5/9/2025</a:t>
+              <a:t>5/10/2025</a:t>
             </a:fld>
             <a:endParaRPr lang="en-US" dirty="0"/>
           </a:p>
@@ -1080,7 +1080,10 @@
           <a:bodyPr/>
           <a:lstStyle/>
           <a:p>
-            <a:endParaRPr lang="en-US" dirty="0"/>
+            <a:r>
+              <a:rPr lang="en-US" dirty="0"/>
+              <a:t>So, this presentation is on improving patient experience using AI. The project focusses on predicting patients at risk of clinical deterioration using healthcare data. I’ll be going through the process from problem definition to the evaluation and final product.</a:t>
+            </a:r>
           </a:p>
         </p:txBody>
       </p:sp>
@@ -1164,6 +1167,42 @@
           <a:bodyPr/>
           <a:lstStyle/>
           <a:p>
+            <a:pPr>
+              <a:buNone/>
+            </a:pPr>
+            <a:r>
+              <a:rPr lang="en-US" dirty="0"/>
+              <a:t>In summary, this project explored how AI can be used to improve patient experience by predicting risk of clinical deterioration. Although we started with simple models, and results weren’t perfect, the process revealed some key lessons.</a:t>
+            </a:r>
+          </a:p>
+          <a:p>
+            <a:pPr>
+              <a:buNone/>
+            </a:pPr>
+            <a:endParaRPr lang="en-US" dirty="0"/>
+          </a:p>
+          <a:p>
+            <a:pPr>
+              <a:buNone/>
+            </a:pPr>
+            <a:r>
+              <a:rPr lang="en-US" dirty="0"/>
+              <a:t>The biggest takeaway was how important it is to handle data imbalance and outliers. Even more than tuning the model, those preprocessing steps made the real difference. This also shows how critical data quality is in healthcare AI.</a:t>
+            </a:r>
+          </a:p>
+          <a:p>
+            <a:pPr>
+              <a:buNone/>
+            </a:pPr>
+            <a:endParaRPr lang="en-US" dirty="0"/>
+          </a:p>
+          <a:p>
+            <a:r>
+              <a:rPr lang="en-US" dirty="0"/>
+              <a:t>While more work is needed to make it clinically applicable, this kind of project lays the groundwork for future solutions that are personalised, preventative, and ultimately improve patient outcomes with the support of AI</a:t>
+            </a:r>
+          </a:p>
+          <a:p>
             <a:endParaRPr lang="en-US" dirty="0"/>
           </a:p>
         </p:txBody>
@@ -1248,7 +1287,19 @@
           <a:bodyPr/>
           <a:lstStyle/>
           <a:p>
+            <a:r>
+              <a:rPr lang="en-US" dirty="0"/>
+              <a:t>The goal here is to create an AI model that predicts patients at risk. </a:t>
+            </a:r>
+          </a:p>
+          <a:p>
             <a:endParaRPr lang="en-US" dirty="0"/>
+          </a:p>
+          <a:p>
+            <a:r>
+              <a:rPr lang="en-US" dirty="0"/>
+              <a:t>This is something that would be incredibly helpful for healthcare professionals in order to provide an earlier intervention for several medical problems. This ties closely into improving outcomes and reducing the strain on hospitals, post-pandemic. </a:t>
+            </a:r>
           </a:p>
         </p:txBody>
       </p:sp>
@@ -1332,7 +1383,19 @@
           <a:bodyPr/>
           <a:lstStyle/>
           <a:p>
+            <a:r>
+              <a:rPr lang="en-US" dirty="0"/>
+              <a:t>The dataset used was synthetic to simulate real healthcare records. It included features like age, vital signs, medical history, ad lifestyle factors. </a:t>
+            </a:r>
+          </a:p>
+          <a:p>
             <a:endParaRPr lang="en-US" dirty="0"/>
+          </a:p>
+          <a:p>
+            <a:r>
+              <a:rPr lang="en-US" dirty="0"/>
+              <a:t>While a clean and useful dataset for prototyping, it doesn’t capture the full complexity of real-world data, making it less suitable for evaluating how well a model would perform in an unpredictable, noisy clinical environment. </a:t>
+            </a:r>
           </a:p>
         </p:txBody>
       </p:sp>
@@ -1416,7 +1479,28 @@
           <a:bodyPr/>
           <a:lstStyle/>
           <a:p>
+            <a:r>
+              <a:rPr lang="en-US" dirty="0"/>
+              <a:t>The problem being solved is a classification one.</a:t>
+            </a:r>
+          </a:p>
+          <a:p>
             <a:endParaRPr lang="en-US" dirty="0"/>
+          </a:p>
+          <a:p>
+            <a:r>
+              <a:rPr lang="en-US" dirty="0"/>
+              <a:t>Random forest was chosen for its ability to handle complex patterns and mixed data types. </a:t>
+            </a:r>
+          </a:p>
+          <a:p>
+            <a:endParaRPr lang="en-US" dirty="0"/>
+          </a:p>
+          <a:p>
+            <a:r>
+              <a:rPr lang="en-US" dirty="0"/>
+              <a:t>Logistic regression offers more simplicity and interpretability which is key for trust in clinical settings. </a:t>
+            </a:r>
           </a:p>
         </p:txBody>
       </p:sp>
@@ -1500,7 +1584,29 @@
           <a:bodyPr/>
           <a:lstStyle/>
           <a:p>
+            <a:pPr>
+              <a:buNone/>
+            </a:pPr>
+            <a:r>
+              <a:rPr lang="en-US" b="0" i="0" dirty="0"/>
+              <a:t>Since the original dataset didn’t include a ready-made label for predicting deterioration risk, I created a binary target variable called At_Risk. </a:t>
+            </a:r>
+            <a:r>
+              <a:rPr lang="en-US" dirty="0"/>
+              <a:t>This was based on recovery time — anyone taking more than 5 days to recover was marked as ‘at risk’. This gave the model something meaningful to learn from.</a:t>
+            </a:r>
+          </a:p>
+          <a:p>
+            <a:pPr>
+              <a:buNone/>
+            </a:pPr>
             <a:endParaRPr lang="en-US" dirty="0"/>
+          </a:p>
+          <a:p>
+            <a:r>
+              <a:rPr lang="en-US" dirty="0"/>
+              <a:t>Then I moved into preprocessing — removing irrelevant columns like ID, encoding categoricals for model compatibility, scaling numerical features for consistency, and handling outliers to reduce noise. After that, I split the data 80/20 to balance training and evaluation, trained Random Forest and Logistic Regression models, and finally applied SMOTE to fix the class imbalance, since there were fewer at-risk cases</a:t>
+            </a:r>
           </a:p>
         </p:txBody>
       </p:sp>
@@ -1584,6 +1690,43 @@
           <a:bodyPr/>
           <a:lstStyle/>
           <a:p>
+            <a:pPr>
+              <a:buNone/>
+            </a:pPr>
+            <a:r>
+              <a:rPr lang="en-US" b="1" dirty="0"/>
+              <a:t>The distribution plots</a:t>
+            </a:r>
+            <a:r>
+              <a:rPr lang="en-US" dirty="0"/>
+              <a:t> (right) show how each feature is spread across the dataset. Most continuous variables like Blood Pressure and Lab Test Results follow a normal distribution, while categorical features like Patient Satisfaction are more discrete. These visuals helped identify scaling needs and potential outliers.</a:t>
+            </a:r>
+          </a:p>
+          <a:p>
+            <a:pPr>
+              <a:buNone/>
+            </a:pPr>
+            <a:endParaRPr lang="en-US" dirty="0"/>
+          </a:p>
+          <a:p>
+            <a:r>
+              <a:rPr lang="en-US" b="1" dirty="0"/>
+              <a:t>The correlation heatmap</a:t>
+            </a:r>
+            <a:r>
+              <a:rPr lang="en-US" dirty="0"/>
+              <a:t> (left) highlights relationships between features. It shows weak correlations across most variables, which supports using models that handle low multicollinearity. Notably, </a:t>
+            </a:r>
+            <a:r>
+              <a:rPr lang="en-US" i="1" dirty="0"/>
+              <a:t>At_Risk</a:t>
+            </a:r>
+            <a:r>
+              <a:rPr lang="en-US" dirty="0"/>
+              <a:t> has low correlation with individual features, suggesting the need for ensemble methods like Random Forest to capture complex patterns.</a:t>
+            </a:r>
+          </a:p>
+          <a:p>
             <a:endParaRPr lang="en-GB" dirty="0"/>
           </a:p>
         </p:txBody>
@@ -1668,7 +1811,48 @@
           <a:bodyPr/>
           <a:lstStyle/>
           <a:p>
+            <a:pPr>
+              <a:buNone/>
+            </a:pPr>
+            <a:r>
+              <a:rPr lang="en-US" dirty="0"/>
+              <a:t>I trained both Random Forest and Logistic Regression models on the data. To assess how reliable they are, I used 5-fold cross-validation, which splits the data into multiple parts to test how consistent the model performs across different subsets , this helps avoid overfitting.</a:t>
+            </a:r>
+          </a:p>
+          <a:p>
+            <a:pPr>
+              <a:buNone/>
+            </a:pPr>
             <a:endParaRPr lang="en-US" dirty="0"/>
+          </a:p>
+          <a:p>
+            <a:pPr>
+              <a:buNone/>
+            </a:pPr>
+            <a:r>
+              <a:rPr lang="en-US" dirty="0"/>
+              <a:t>Next, I tuned the models’ hyperparameters, like increasing the number of trees and depth for Random Forest, and adjusting regularization for Logistic Regression , to try and improve performance.</a:t>
+            </a:r>
+          </a:p>
+          <a:p>
+            <a:pPr>
+              <a:buNone/>
+            </a:pPr>
+            <a:endParaRPr lang="en-US" dirty="0"/>
+          </a:p>
+          <a:p>
+            <a:r>
+              <a:rPr lang="en-US" dirty="0"/>
+              <a:t>Then I applied SMOTE, which is a method to generate new samples for the minority class , in this case, patients at risk. The dataset was imbalanced, meaning there were fewer at-risk cases, which can cause models to ignore them. By applying SMOTE </a:t>
+            </a:r>
+            <a:r>
+              <a:rPr lang="en-US" i="1" dirty="0"/>
+              <a:t>after outlier removal</a:t>
+            </a:r>
+            <a:r>
+              <a:rPr lang="en-US" dirty="0"/>
+              <a:t>, the model had more balanced data and could better learn the patterns associated with risk.</a:t>
+            </a:r>
           </a:p>
         </p:txBody>
       </p:sp>
@@ -1752,6 +1936,50 @@
           <a:bodyPr/>
           <a:lstStyle/>
           <a:p>
+            <a:pPr>
+              <a:buNone/>
+            </a:pPr>
+            <a:r>
+              <a:rPr lang="en-US" dirty="0"/>
+              <a:t>Here’s where we see the performance. Baseline models had okay accuracy around 54% but accuracy alone doesn’t tell the full story in healthcare. The real issue was </a:t>
+            </a:r>
+            <a:r>
+              <a:rPr lang="en-US" b="1" dirty="0"/>
+              <a:t>recall</a:t>
+            </a:r>
+            <a:r>
+              <a:rPr lang="en-US" dirty="0"/>
+              <a:t> for the at-risk class, which was extremely low 4% for Logistic Regression and 16% for Random Forest.</a:t>
+            </a:r>
+          </a:p>
+          <a:p>
+            <a:pPr>
+              <a:buNone/>
+            </a:pPr>
+            <a:endParaRPr lang="en-US" dirty="0"/>
+          </a:p>
+          <a:p>
+            <a:pPr>
+              <a:buNone/>
+            </a:pPr>
+            <a:r>
+              <a:rPr lang="en-US" dirty="0"/>
+              <a:t>After tuning, performance stayed mostly the same it didn’t make a big difference. But once I applied SMOTE, recall for the at-risk group jumped: Logistic Regression went from 4% to 39%, and Random Forest from 16% to 28%. That’s huge in a clinical context where missing a high-risk patient could mean delayed care or worse outcomes.</a:t>
+            </a:r>
+          </a:p>
+          <a:p>
+            <a:pPr>
+              <a:buNone/>
+            </a:pPr>
+            <a:endParaRPr lang="en-US" dirty="0"/>
+          </a:p>
+          <a:p>
+            <a:r>
+              <a:rPr lang="en-US" dirty="0"/>
+              <a:t>So overall, this really shows that class imbalance is a bigger issue than model choice. Addressing it directly made the most impact.</a:t>
+            </a:r>
+          </a:p>
+          <a:p>
             <a:endParaRPr lang="en-US" dirty="0"/>
           </a:p>
         </p:txBody>
@@ -1835,6 +2063,42 @@
         <p:txBody>
           <a:bodyPr/>
           <a:lstStyle/>
+          <a:p>
+            <a:pPr>
+              <a:buNone/>
+            </a:pPr>
+            <a:r>
+              <a:rPr lang="en-US" dirty="0"/>
+              <a:t>There were a few key limitations. First, the dataset was synthetic it was clean and easy to work with, but it didn’t reflect the messiness of real-world patient data like missing values, noise, or rare edge cases. That limits how realistic our model performance is.</a:t>
+            </a:r>
+          </a:p>
+          <a:p>
+            <a:pPr>
+              <a:buNone/>
+            </a:pPr>
+            <a:endParaRPr lang="en-US" dirty="0"/>
+          </a:p>
+          <a:p>
+            <a:pPr>
+              <a:buNone/>
+            </a:pPr>
+            <a:r>
+              <a:rPr lang="en-US" dirty="0"/>
+              <a:t>Second, even with SMOTE, the models still had trouble consistently identifying the minority class. This could be due to limited features for example, we didn’t have time-series data or live vitals which are often key in real clinical decision-making.</a:t>
+            </a:r>
+          </a:p>
+          <a:p>
+            <a:pPr>
+              <a:buNone/>
+            </a:pPr>
+            <a:endParaRPr lang="en-US" dirty="0"/>
+          </a:p>
+          <a:p>
+            <a:r>
+              <a:rPr lang="en-US" dirty="0"/>
+              <a:t>For future improvements, I’d look at testing this approach on a more realistic dataset, potentially one with longitudinal health data. I’d also consider trying more advanced models like Gradient Boosting or using ensemble approaches to handle imbalance better. And adding model explainability tools like SHAP would help make the predictions more transparent for clinicians</a:t>
+            </a:r>
+          </a:p>
           <a:p>
             <a:endParaRPr lang="en-US" dirty="0"/>
           </a:p>
@@ -9032,7 +9296,7 @@
           <a:p>
             <a:fld id="{F9B8B6D2-5532-4B59-9C5A-AB106F128946}" type="datetime1">
               <a:rPr lang="en-US" smtClean="0"/>
-              <a:t>5/9/2025</a:t>
+              <a:t>5/10/2025</a:t>
             </a:fld>
             <a:endParaRPr lang="en-US" dirty="0"/>
           </a:p>
@@ -9871,13 +10135,13 @@
           <a:lstStyle/>
           <a:p>
             <a:r>
-              <a:rPr lang="en-US" sz="1800" u="sng" dirty="0"/>
+              <a:rPr lang="en-US" u="sng" dirty="0"/>
               <a:t>Problem Statement</a:t>
             </a:r>
           </a:p>
           <a:p>
             <a:r>
-              <a:rPr lang="en-US" sz="1600" dirty="0"/>
+              <a:rPr lang="en-US" sz="2000" dirty="0"/>
               <a:t>The project is to develop an AI driven solution that predicts patients at risk of clinical deterioration based on healthcare data</a:t>
             </a:r>
           </a:p>
@@ -10805,7 +11069,7 @@
         </p:spPr>
         <p:txBody>
           <a:bodyPr>
-            <a:normAutofit lnSpcReduction="10000"/>
+            <a:normAutofit fontScale="92500" lnSpcReduction="10000"/>
           </a:bodyPr>
           <a:lstStyle/>
           <a:p>
@@ -10819,7 +11083,7 @@
             </a:pPr>
             <a:r>
               <a:rPr lang="en-GB" sz="1600" dirty="0"/>
-              <a:t>The problem of late deterioration detection was tackled by creating a binary target based on recovery time (&gt; 5 days = at risk). Preprocessing steps like dropping irrelevant features, encoding categoricals, handling missing values, and scaling numericals ensured clean, usable data.</a:t>
+              <a:t>The problem of late deterioration detection was tackled by creating a binary target based on recovery time (&gt; 5 days = at risk). Preprocessing steps like dropping irrelevant features, encoding categoricals, handling missing values, handling outliers and scaling numericals ensured clean, usable data.</a:t>
             </a:r>
           </a:p>
           <a:p>
@@ -10992,8 +11256,8 @@
         </p:blipFill>
         <p:spPr>
           <a:xfrm>
-            <a:off x="6972670" y="345715"/>
-            <a:ext cx="4876142" cy="4226285"/>
+            <a:off x="7032989" y="1226089"/>
+            <a:ext cx="4581155" cy="3970612"/>
           </a:xfrm>
           <a:prstGeom prst="rect">
             <a:avLst/>
@@ -11021,7 +11285,7 @@
         </p:blipFill>
         <p:spPr>
           <a:xfrm>
-            <a:off x="2703342" y="2933723"/>
+            <a:off x="2735039" y="1503088"/>
             <a:ext cx="4122332" cy="3408219"/>
           </a:xfrm>
           <a:prstGeom prst="rect">
@@ -11029,6 +11293,45 @@
           </a:prstGeom>
         </p:spPr>
       </p:pic>
+      <p:sp>
+        <p:nvSpPr>
+          <p:cNvPr id="7" name="TextBox 6">
+            <a:extLst>
+              <a:ext uri="{FF2B5EF4-FFF2-40B4-BE49-F238E27FC236}">
+                <a16:creationId xmlns:a16="http://schemas.microsoft.com/office/drawing/2014/main" id="{60B786B8-6C36-20CB-402C-4FA0B29A348E}"/>
+              </a:ext>
+            </a:extLst>
+          </p:cNvPr>
+          <p:cNvSpPr txBox="1"/>
+          <p:nvPr/>
+        </p:nvSpPr>
+        <p:spPr>
+          <a:xfrm>
+            <a:off x="2735039" y="579758"/>
+            <a:ext cx="9206135" cy="646331"/>
+          </a:xfrm>
+          <a:prstGeom prst="rect">
+            <a:avLst/>
+          </a:prstGeom>
+          <a:noFill/>
+        </p:spPr>
+        <p:txBody>
+          <a:bodyPr wrap="square" rtlCol="0">
+            <a:spAutoFit/>
+          </a:bodyPr>
+          <a:lstStyle/>
+          <a:p>
+            <a:r>
+              <a:rPr lang="en-GB" dirty="0">
+                <a:solidFill>
+                  <a:schemeClr val="tx2"/>
+                </a:solidFill>
+              </a:rPr>
+              <a:t>Here we can see the visualisations of feature distributions and correlations which helps guide the preprocessing decisions such as scaling, outlier handling and feature selection.</a:t>
+            </a:r>
+          </a:p>
+        </p:txBody>
+      </p:sp>
     </p:spTree>
     <p:extLst>
       <p:ext uri="{BB962C8B-B14F-4D97-AF65-F5344CB8AC3E}">
@@ -13046,26 +13349,6 @@
 </file>
 
 <file path=customXml/item1.xml><?xml version="1.0" encoding="utf-8"?>
-<p:properties xmlns:p="http://schemas.microsoft.com/office/2006/metadata/properties" xmlns:xsi="http://www.w3.org/2001/XMLSchema-instance" xmlns:pc="http://schemas.microsoft.com/office/infopath/2007/PartnerControls">
-  <documentManagement>
-    <_ip_UnifiedCompliancePolicyUIAction xmlns="http://schemas.microsoft.com/sharepoint/v3" xsi:nil="true"/>
-    <Image xmlns="71af3243-3dd4-4a8d-8c0d-dd76da1f02a5">
-      <Url xsi:nil="true"/>
-      <Description xsi:nil="true"/>
-    </Image>
-    <Status xmlns="71af3243-3dd4-4a8d-8c0d-dd76da1f02a5">Not started</Status>
-    <Background xmlns="71af3243-3dd4-4a8d-8c0d-dd76da1f02a5">false</Background>
-    <_ip_UnifiedCompliancePolicyProperties xmlns="http://schemas.microsoft.com/sharepoint/v3" xsi:nil="true"/>
-    <ImageTagsTaxHTField xmlns="71af3243-3dd4-4a8d-8c0d-dd76da1f02a5">
-      <Terms xmlns="http://schemas.microsoft.com/office/infopath/2007/PartnerControls"/>
-    </ImageTagsTaxHTField>
-    <TaxCatchAll xmlns="230e9df3-be65-4c73-a93b-d1236ebd677e" xsi:nil="true"/>
-    <MediaServiceKeyPoints xmlns="71af3243-3dd4-4a8d-8c0d-dd76da1f02a5" xsi:nil="true"/>
-  </documentManagement>
-</p:properties>
-</file>
-
-<file path=customXml/item2.xml><?xml version="1.0" encoding="utf-8"?>
 <ct:contentTypeSchema xmlns:ct="http://schemas.microsoft.com/office/2006/metadata/contentType" xmlns:ma="http://schemas.microsoft.com/office/2006/metadata/properties/metaAttributes" ct:_="" ma:_="" ma:contentTypeName="Document" ma:contentTypeID="0x01010079F111ED35F8CC479449609E8A0923A6" ma:contentTypeVersion="28" ma:contentTypeDescription="Create a new document." ma:contentTypeScope="" ma:versionID="60f5a4f2d2b0abadcf532d48ebf9cb71">
   <xsd:schema xmlns:xsd="http://www.w3.org/2001/XMLSchema" xmlns:xs="http://www.w3.org/2001/XMLSchema" xmlns:p="http://schemas.microsoft.com/office/2006/metadata/properties" xmlns:ns1="http://schemas.microsoft.com/sharepoint/v3" xmlns:ns2="71af3243-3dd4-4a8d-8c0d-dd76da1f02a5" xmlns:ns3="16c05727-aa75-4e4a-9b5f-8a80a1165891" xmlns:ns4="230e9df3-be65-4c73-a93b-d1236ebd677e" targetNamespace="http://schemas.microsoft.com/office/2006/metadata/properties" ma:root="true" ma:fieldsID="7dd78129e6a1811f84807ad11c651531" ns1:_="" ns2:_="" ns3:_="" ns4:_="">
     <xsd:import namespace="http://schemas.microsoft.com/sharepoint/v3"/>
@@ -13377,6 +13660,26 @@
 </ct:contentTypeSchema>
 </file>
 
+<file path=customXml/item2.xml><?xml version="1.0" encoding="utf-8"?>
+<p:properties xmlns:p="http://schemas.microsoft.com/office/2006/metadata/properties" xmlns:xsi="http://www.w3.org/2001/XMLSchema-instance" xmlns:pc="http://schemas.microsoft.com/office/infopath/2007/PartnerControls">
+  <documentManagement>
+    <_ip_UnifiedCompliancePolicyUIAction xmlns="http://schemas.microsoft.com/sharepoint/v3" xsi:nil="true"/>
+    <Image xmlns="71af3243-3dd4-4a8d-8c0d-dd76da1f02a5">
+      <Url xsi:nil="true"/>
+      <Description xsi:nil="true"/>
+    </Image>
+    <Status xmlns="71af3243-3dd4-4a8d-8c0d-dd76da1f02a5">Not started</Status>
+    <Background xmlns="71af3243-3dd4-4a8d-8c0d-dd76da1f02a5">false</Background>
+    <_ip_UnifiedCompliancePolicyProperties xmlns="http://schemas.microsoft.com/sharepoint/v3" xsi:nil="true"/>
+    <ImageTagsTaxHTField xmlns="71af3243-3dd4-4a8d-8c0d-dd76da1f02a5">
+      <Terms xmlns="http://schemas.microsoft.com/office/infopath/2007/PartnerControls"/>
+    </ImageTagsTaxHTField>
+    <TaxCatchAll xmlns="230e9df3-be65-4c73-a93b-d1236ebd677e" xsi:nil="true"/>
+    <MediaServiceKeyPoints xmlns="71af3243-3dd4-4a8d-8c0d-dd76da1f02a5" xsi:nil="true"/>
+  </documentManagement>
+</p:properties>
+</file>
+
 <file path=customXml/item3.xml><?xml version="1.0" encoding="utf-8"?>
 <?mso-contentType ?>
 <FormTemplates xmlns="http://schemas.microsoft.com/sharepoint/v3/contenttype/forms">
@@ -13387,18 +13690,6 @@
 </file>
 
 <file path=customXml/itemProps1.xml><?xml version="1.0" encoding="utf-8"?>
-<ds:datastoreItem xmlns:ds="http://schemas.openxmlformats.org/officeDocument/2006/customXml" ds:itemID="{89316C43-4A17-4971-BB8F-F0F6B8CDF2E0}">
-  <ds:schemaRefs>
-    <ds:schemaRef ds:uri="http://schemas.microsoft.com/office/2006/metadata/properties"/>
-    <ds:schemaRef ds:uri="http://schemas.microsoft.com/office/infopath/2007/PartnerControls"/>
-    <ds:schemaRef ds:uri="http://schemas.microsoft.com/sharepoint/v3"/>
-    <ds:schemaRef ds:uri="71af3243-3dd4-4a8d-8c0d-dd76da1f02a5"/>
-    <ds:schemaRef ds:uri="230e9df3-be65-4c73-a93b-d1236ebd677e"/>
-  </ds:schemaRefs>
-</ds:datastoreItem>
-</file>
-
-<file path=customXml/itemProps2.xml><?xml version="1.0" encoding="utf-8"?>
 <ds:datastoreItem xmlns:ds="http://schemas.openxmlformats.org/officeDocument/2006/customXml" ds:itemID="{BC2A85E2-5219-4B5F-9D52-D97CA94AAB32}">
   <ds:schemaRefs>
     <ds:schemaRef ds:uri="http://schemas.microsoft.com/office/2006/metadata/contentType"/>
@@ -13419,6 +13710,18 @@
 </ds:datastoreItem>
 </file>
 
+<file path=customXml/itemProps2.xml><?xml version="1.0" encoding="utf-8"?>
+<ds:datastoreItem xmlns:ds="http://schemas.openxmlformats.org/officeDocument/2006/customXml" ds:itemID="{89316C43-4A17-4971-BB8F-F0F6B8CDF2E0}">
+  <ds:schemaRefs>
+    <ds:schemaRef ds:uri="http://schemas.microsoft.com/office/2006/metadata/properties"/>
+    <ds:schemaRef ds:uri="http://schemas.microsoft.com/office/infopath/2007/PartnerControls"/>
+    <ds:schemaRef ds:uri="http://schemas.microsoft.com/sharepoint/v3"/>
+    <ds:schemaRef ds:uri="71af3243-3dd4-4a8d-8c0d-dd76da1f02a5"/>
+    <ds:schemaRef ds:uri="230e9df3-be65-4c73-a93b-d1236ebd677e"/>
+  </ds:schemaRefs>
+</ds:datastoreItem>
+</file>
+
 <file path=customXml/itemProps3.xml><?xml version="1.0" encoding="utf-8"?>
 <ds:datastoreItem xmlns:ds="http://schemas.openxmlformats.org/officeDocument/2006/customXml" ds:itemID="{F5C14155-A57F-48FA-B253-A79CB6269DDC}">
   <ds:schemaRefs>

</xml_diff>